<commit_message>
last change to figure and relevant literature txt updated
</commit_message>
<xml_diff>
--- a/documents/figure1.pptx
+++ b/documents/figure1.pptx
@@ -117,7 +117,7 @@
 <file path=ppt/revisionInfo.xml><?xml version="1.0" encoding="utf-8"?>
 <p1510:revInfo xmlns:a="http://schemas.openxmlformats.org/drawingml/2006/main" xmlns:r="http://schemas.openxmlformats.org/officeDocument/2006/relationships" xmlns:p1510="http://schemas.microsoft.com/office/powerpoint/2015/10/main">
   <p1510:revLst>
-    <p1510:client id="{2A3F39FC-901B-4154-829D-ABB3A00DA094}" v="67" dt="2025-02-13T10:23:54.514"/>
+    <p1510:client id="{2A3F39FC-901B-4154-829D-ABB3A00DA094}" v="68" dt="2025-02-19T08:53:01.590"/>
   </p1510:revLst>
 </p1510:revInfo>
 </file>
@@ -127,7 +127,7 @@
   <pc:docChgLst>
     <pc:chgData name="Castiello de Obeso, Santiago" userId="b4fc0b8e-1f0e-417a-8aad-015961d2398a" providerId="ADAL" clId="{2A3F39FC-901B-4154-829D-ABB3A00DA094}"/>
     <pc:docChg chg="undo custSel addSld delSld modSld">
-      <pc:chgData name="Castiello de Obeso, Santiago" userId="b4fc0b8e-1f0e-417a-8aad-015961d2398a" providerId="ADAL" clId="{2A3F39FC-901B-4154-829D-ABB3A00DA094}" dt="2025-02-13T10:23:56.391" v="1561" actId="21"/>
+      <pc:chgData name="Castiello de Obeso, Santiago" userId="b4fc0b8e-1f0e-417a-8aad-015961d2398a" providerId="ADAL" clId="{2A3F39FC-901B-4154-829D-ABB3A00DA094}" dt="2025-02-19T08:53:02.654" v="1681" actId="21"/>
       <pc:docMkLst>
         <pc:docMk/>
       </pc:docMkLst>
@@ -641,13 +641,13 @@
         </pc:cxnChg>
       </pc:sldChg>
       <pc:sldChg chg="addSp delSp modSp add mod">
-        <pc:chgData name="Castiello de Obeso, Santiago" userId="b4fc0b8e-1f0e-417a-8aad-015961d2398a" providerId="ADAL" clId="{2A3F39FC-901B-4154-829D-ABB3A00DA094}" dt="2025-02-13T10:23:56.391" v="1561" actId="21"/>
+        <pc:chgData name="Castiello de Obeso, Santiago" userId="b4fc0b8e-1f0e-417a-8aad-015961d2398a" providerId="ADAL" clId="{2A3F39FC-901B-4154-829D-ABB3A00DA094}" dt="2025-02-19T08:53:02.654" v="1681" actId="21"/>
         <pc:sldMkLst>
           <pc:docMk/>
           <pc:sldMk cId="2654144847" sldId="259"/>
         </pc:sldMkLst>
         <pc:spChg chg="mod">
-          <ac:chgData name="Castiello de Obeso, Santiago" userId="b4fc0b8e-1f0e-417a-8aad-015961d2398a" providerId="ADAL" clId="{2A3F39FC-901B-4154-829D-ABB3A00DA094}" dt="2025-02-13T10:22:48.845" v="1543" actId="1037"/>
+          <ac:chgData name="Castiello de Obeso, Santiago" userId="b4fc0b8e-1f0e-417a-8aad-015961d2398a" providerId="ADAL" clId="{2A3F39FC-901B-4154-829D-ABB3A00DA094}" dt="2025-02-19T08:52:43.014" v="1670" actId="1036"/>
           <ac:spMkLst>
             <pc:docMk/>
             <pc:sldMk cId="2654144847" sldId="259"/>
@@ -655,7 +655,7 @@
           </ac:spMkLst>
         </pc:spChg>
         <pc:spChg chg="mod">
-          <ac:chgData name="Castiello de Obeso, Santiago" userId="b4fc0b8e-1f0e-417a-8aad-015961d2398a" providerId="ADAL" clId="{2A3F39FC-901B-4154-829D-ABB3A00DA094}" dt="2025-02-13T10:23:03.380" v="1550" actId="1038"/>
+          <ac:chgData name="Castiello de Obeso, Santiago" userId="b4fc0b8e-1f0e-417a-8aad-015961d2398a" providerId="ADAL" clId="{2A3F39FC-901B-4154-829D-ABB3A00DA094}" dt="2025-02-19T08:52:40.146" v="1668" actId="1036"/>
           <ac:spMkLst>
             <pc:docMk/>
             <pc:sldMk cId="2654144847" sldId="259"/>
@@ -663,7 +663,7 @@
           </ac:spMkLst>
         </pc:spChg>
         <pc:spChg chg="mod">
-          <ac:chgData name="Castiello de Obeso, Santiago" userId="b4fc0b8e-1f0e-417a-8aad-015961d2398a" providerId="ADAL" clId="{2A3F39FC-901B-4154-829D-ABB3A00DA094}" dt="2025-02-13T10:23:18.047" v="1556" actId="1037"/>
+          <ac:chgData name="Castiello de Obeso, Santiago" userId="b4fc0b8e-1f0e-417a-8aad-015961d2398a" providerId="ADAL" clId="{2A3F39FC-901B-4154-829D-ABB3A00DA094}" dt="2025-02-19T08:52:45.789" v="1673" actId="1036"/>
           <ac:spMkLst>
             <pc:docMk/>
             <pc:sldMk cId="2654144847" sldId="259"/>
@@ -671,11 +671,43 @@
           </ac:spMkLst>
         </pc:spChg>
         <pc:spChg chg="mod">
-          <ac:chgData name="Castiello de Obeso, Santiago" userId="b4fc0b8e-1f0e-417a-8aad-015961d2398a" providerId="ADAL" clId="{2A3F39FC-901B-4154-829D-ABB3A00DA094}" dt="2025-02-13T10:23:12.420" v="1552" actId="1037"/>
+          <ac:chgData name="Castiello de Obeso, Santiago" userId="b4fc0b8e-1f0e-417a-8aad-015961d2398a" providerId="ADAL" clId="{2A3F39FC-901B-4154-829D-ABB3A00DA094}" dt="2025-02-19T08:52:50.426" v="1679" actId="1036"/>
           <ac:spMkLst>
             <pc:docMk/>
             <pc:sldMk cId="2654144847" sldId="259"/>
             <ac:spMk id="28" creationId="{C9FAB2C4-5BD4-F370-AD6D-12509B472918}"/>
+          </ac:spMkLst>
+        </pc:spChg>
+        <pc:spChg chg="mod">
+          <ac:chgData name="Castiello de Obeso, Santiago" userId="b4fc0b8e-1f0e-417a-8aad-015961d2398a" providerId="ADAL" clId="{2A3F39FC-901B-4154-829D-ABB3A00DA094}" dt="2025-02-19T08:52:45.789" v="1673" actId="1036"/>
+          <ac:spMkLst>
+            <pc:docMk/>
+            <pc:sldMk cId="2654144847" sldId="259"/>
+            <ac:spMk id="30" creationId="{78CC408B-0F22-FF8A-6907-86D5430A4F88}"/>
+          </ac:spMkLst>
+        </pc:spChg>
+        <pc:spChg chg="mod">
+          <ac:chgData name="Castiello de Obeso, Santiago" userId="b4fc0b8e-1f0e-417a-8aad-015961d2398a" providerId="ADAL" clId="{2A3F39FC-901B-4154-829D-ABB3A00DA094}" dt="2025-02-19T08:52:50.426" v="1679" actId="1036"/>
+          <ac:spMkLst>
+            <pc:docMk/>
+            <pc:sldMk cId="2654144847" sldId="259"/>
+            <ac:spMk id="31" creationId="{A12F9848-AE78-5A80-9AB8-AD2400EEA281}"/>
+          </ac:spMkLst>
+        </pc:spChg>
+        <pc:spChg chg="mod">
+          <ac:chgData name="Castiello de Obeso, Santiago" userId="b4fc0b8e-1f0e-417a-8aad-015961d2398a" providerId="ADAL" clId="{2A3F39FC-901B-4154-829D-ABB3A00DA094}" dt="2025-02-19T08:52:43.014" v="1670" actId="1036"/>
+          <ac:spMkLst>
+            <pc:docMk/>
+            <pc:sldMk cId="2654144847" sldId="259"/>
+            <ac:spMk id="32" creationId="{26C9FCAA-8136-A866-6E78-DD0970EE3F3F}"/>
+          </ac:spMkLst>
+        </pc:spChg>
+        <pc:spChg chg="mod">
+          <ac:chgData name="Castiello de Obeso, Santiago" userId="b4fc0b8e-1f0e-417a-8aad-015961d2398a" providerId="ADAL" clId="{2A3F39FC-901B-4154-829D-ABB3A00DA094}" dt="2025-02-19T08:52:40.146" v="1668" actId="1036"/>
+          <ac:spMkLst>
+            <pc:docMk/>
+            <pc:sldMk cId="2654144847" sldId="259"/>
+            <ac:spMk id="33" creationId="{3B87FEF5-BD77-633C-FD00-A2F464285888}"/>
           </ac:spMkLst>
         </pc:spChg>
         <pc:spChg chg="mod">
@@ -694,12 +726,12 @@
             <ac:spMk id="156" creationId="{FC381741-50A4-D934-2C01-24BF7FBE0377}"/>
           </ac:spMkLst>
         </pc:spChg>
-        <pc:picChg chg="add del mod">
-          <ac:chgData name="Castiello de Obeso, Santiago" userId="b4fc0b8e-1f0e-417a-8aad-015961d2398a" providerId="ADAL" clId="{2A3F39FC-901B-4154-829D-ABB3A00DA094}" dt="2025-02-13T10:23:56.391" v="1561" actId="21"/>
+        <pc:picChg chg="add del">
+          <ac:chgData name="Castiello de Obeso, Santiago" userId="b4fc0b8e-1f0e-417a-8aad-015961d2398a" providerId="ADAL" clId="{2A3F39FC-901B-4154-829D-ABB3A00DA094}" dt="2025-02-19T08:53:02.654" v="1681" actId="21"/>
           <ac:picMkLst>
             <pc:docMk/>
             <pc:sldMk cId="2654144847" sldId="259"/>
-            <ac:picMk id="3" creationId="{4A387050-1E1B-1F9C-61DF-34A1B0696833}"/>
+            <ac:picMk id="3" creationId="{A0CEC4DE-B50C-731D-6C3B-0321DB859291}"/>
           </ac:picMkLst>
         </pc:picChg>
       </pc:sldChg>
@@ -857,7 +889,7 @@
           <a:p>
             <a:fld id="{0AFA125D-6C16-440D-B65A-850231F6884E}" type="datetimeFigureOut">
               <a:rPr lang="en-GB" smtClean="0"/>
-              <a:t>13/02/2025</a:t>
+              <a:t>19/02/2025</a:t>
             </a:fld>
             <a:endParaRPr lang="en-GB"/>
           </a:p>
@@ -1057,7 +1089,7 @@
           <a:p>
             <a:fld id="{0AFA125D-6C16-440D-B65A-850231F6884E}" type="datetimeFigureOut">
               <a:rPr lang="en-GB" smtClean="0"/>
-              <a:t>13/02/2025</a:t>
+              <a:t>19/02/2025</a:t>
             </a:fld>
             <a:endParaRPr lang="en-GB"/>
           </a:p>
@@ -1267,7 +1299,7 @@
           <a:p>
             <a:fld id="{0AFA125D-6C16-440D-B65A-850231F6884E}" type="datetimeFigureOut">
               <a:rPr lang="en-GB" smtClean="0"/>
-              <a:t>13/02/2025</a:t>
+              <a:t>19/02/2025</a:t>
             </a:fld>
             <a:endParaRPr lang="en-GB"/>
           </a:p>
@@ -1467,7 +1499,7 @@
           <a:p>
             <a:fld id="{0AFA125D-6C16-440D-B65A-850231F6884E}" type="datetimeFigureOut">
               <a:rPr lang="en-GB" smtClean="0"/>
-              <a:t>13/02/2025</a:t>
+              <a:t>19/02/2025</a:t>
             </a:fld>
             <a:endParaRPr lang="en-GB"/>
           </a:p>
@@ -1743,7 +1775,7 @@
           <a:p>
             <a:fld id="{0AFA125D-6C16-440D-B65A-850231F6884E}" type="datetimeFigureOut">
               <a:rPr lang="en-GB" smtClean="0"/>
-              <a:t>13/02/2025</a:t>
+              <a:t>19/02/2025</a:t>
             </a:fld>
             <a:endParaRPr lang="en-GB"/>
           </a:p>
@@ -2011,7 +2043,7 @@
           <a:p>
             <a:fld id="{0AFA125D-6C16-440D-B65A-850231F6884E}" type="datetimeFigureOut">
               <a:rPr lang="en-GB" smtClean="0"/>
-              <a:t>13/02/2025</a:t>
+              <a:t>19/02/2025</a:t>
             </a:fld>
             <a:endParaRPr lang="en-GB"/>
           </a:p>
@@ -2426,7 +2458,7 @@
           <a:p>
             <a:fld id="{0AFA125D-6C16-440D-B65A-850231F6884E}" type="datetimeFigureOut">
               <a:rPr lang="en-GB" smtClean="0"/>
-              <a:t>13/02/2025</a:t>
+              <a:t>19/02/2025</a:t>
             </a:fld>
             <a:endParaRPr lang="en-GB"/>
           </a:p>
@@ -2568,7 +2600,7 @@
           <a:p>
             <a:fld id="{0AFA125D-6C16-440D-B65A-850231F6884E}" type="datetimeFigureOut">
               <a:rPr lang="en-GB" smtClean="0"/>
-              <a:t>13/02/2025</a:t>
+              <a:t>19/02/2025</a:t>
             </a:fld>
             <a:endParaRPr lang="en-GB"/>
           </a:p>
@@ -2681,7 +2713,7 @@
           <a:p>
             <a:fld id="{0AFA125D-6C16-440D-B65A-850231F6884E}" type="datetimeFigureOut">
               <a:rPr lang="en-GB" smtClean="0"/>
-              <a:t>13/02/2025</a:t>
+              <a:t>19/02/2025</a:t>
             </a:fld>
             <a:endParaRPr lang="en-GB"/>
           </a:p>
@@ -2994,7 +3026,7 @@
           <a:p>
             <a:fld id="{0AFA125D-6C16-440D-B65A-850231F6884E}" type="datetimeFigureOut">
               <a:rPr lang="en-GB" smtClean="0"/>
-              <a:t>13/02/2025</a:t>
+              <a:t>19/02/2025</a:t>
             </a:fld>
             <a:endParaRPr lang="en-GB"/>
           </a:p>
@@ -3283,7 +3315,7 @@
           <a:p>
             <a:fld id="{0AFA125D-6C16-440D-B65A-850231F6884E}" type="datetimeFigureOut">
               <a:rPr lang="en-GB" smtClean="0"/>
-              <a:t>13/02/2025</a:t>
+              <a:t>19/02/2025</a:t>
             </a:fld>
             <a:endParaRPr lang="en-GB"/>
           </a:p>
@@ -3526,7 +3558,7 @@
           <a:p>
             <a:fld id="{0AFA125D-6C16-440D-B65A-850231F6884E}" type="datetimeFigureOut">
               <a:rPr lang="en-GB" smtClean="0"/>
-              <a:t>13/02/2025</a:t>
+              <a:t>19/02/2025</a:t>
             </a:fld>
             <a:endParaRPr lang="en-GB"/>
           </a:p>
@@ -7235,8 +7267,8 @@
         </p:nvSpPr>
         <p:spPr>
           <a:xfrm>
-            <a:off x="9428915" y="3648381"/>
-            <a:ext cx="2759955" cy="1546577"/>
+            <a:off x="9456459" y="3657711"/>
+            <a:ext cx="2736000" cy="1546577"/>
           </a:xfrm>
           <a:prstGeom prst="rect">
             <a:avLst/>
@@ -7262,8 +7294,8 @@
           <a:p>
             <a:pPr algn="l"/>
             <a:r>
-              <a:rPr lang="en-GB" sz="1050" b="1" dirty="0" err="1"/>
-              <a:t>genAI</a:t>
+              <a:rPr lang="en-GB" sz="1050" b="1" dirty="0"/>
+              <a:t>LLM</a:t>
             </a:r>
             <a:r>
               <a:rPr lang="en-GB" sz="1050" dirty="0"/>
@@ -7288,8 +7320,8 @@
           <a:p>
             <a:pPr algn="l"/>
             <a:r>
-              <a:rPr lang="en-US" sz="1050" b="1" dirty="0" err="1"/>
-              <a:t>genAI</a:t>
+              <a:rPr lang="en-GB" sz="1050" b="1" dirty="0"/>
+              <a:t>LLM</a:t>
             </a:r>
             <a:r>
               <a:rPr lang="en-US" sz="1050" dirty="0"/>
@@ -7313,8 +7345,8 @@
         </p:nvSpPr>
         <p:spPr>
           <a:xfrm>
-            <a:off x="9439268" y="5338045"/>
-            <a:ext cx="2750786" cy="1384995"/>
+            <a:off x="9454743" y="5389362"/>
+            <a:ext cx="2736000" cy="1384995"/>
           </a:xfrm>
           <a:prstGeom prst="rect">
             <a:avLst/>
@@ -7340,8 +7372,8 @@
           <a:p>
             <a:pPr algn="l"/>
             <a:r>
-              <a:rPr lang="en-GB" sz="1050" b="1" dirty="0" err="1"/>
-              <a:t>genAI</a:t>
+              <a:rPr lang="en-GB" sz="1050" b="1" dirty="0"/>
+              <a:t>LLM</a:t>
             </a:r>
             <a:r>
               <a:rPr lang="en-GB" sz="1050" dirty="0"/>
@@ -7366,8 +7398,8 @@
           <a:p>
             <a:pPr algn="l"/>
             <a:r>
-              <a:rPr lang="en-US" sz="1050" b="1" dirty="0" err="1"/>
-              <a:t>genAI</a:t>
+              <a:rPr lang="en-GB" sz="1050" b="1" dirty="0"/>
+              <a:t>LLM</a:t>
             </a:r>
             <a:r>
               <a:rPr lang="en-US" sz="1050" dirty="0"/>
@@ -7391,8 +7423,8 @@
         </p:nvSpPr>
         <p:spPr>
           <a:xfrm>
-            <a:off x="9440600" y="575236"/>
-            <a:ext cx="2750786" cy="1384995"/>
+            <a:off x="9449930" y="612556"/>
+            <a:ext cx="2736000" cy="1223412"/>
           </a:xfrm>
           <a:prstGeom prst="rect">
             <a:avLst/>
@@ -7418,8 +7450,8 @@
           <a:p>
             <a:pPr algn="l"/>
             <a:r>
-              <a:rPr lang="en-GB" sz="1050" b="1" dirty="0" err="1"/>
-              <a:t>genAI</a:t>
+              <a:rPr lang="en-GB" sz="1050" b="1" dirty="0"/>
+              <a:t>LLM</a:t>
             </a:r>
             <a:r>
               <a:rPr lang="en-GB" sz="1050" dirty="0"/>
@@ -7444,12 +7476,8 @@
           <a:p>
             <a:pPr algn="l"/>
             <a:r>
-              <a:rPr lang="en-US" sz="1050" b="1" dirty="0" err="1"/>
-              <a:t>genA</a:t>
-            </a:r>
-            <a:r>
-              <a:rPr lang="en-US" sz="1050" dirty="0" err="1"/>
-              <a:t>I</a:t>
+              <a:rPr lang="en-GB" sz="1050" b="1" dirty="0"/>
+              <a:t>LLM</a:t>
             </a:r>
             <a:r>
               <a:rPr lang="en-US" sz="1050" dirty="0"/>
@@ -7473,8 +7501,8 @@
         </p:nvSpPr>
         <p:spPr>
           <a:xfrm>
-            <a:off x="9442236" y="2131859"/>
-            <a:ext cx="2750785" cy="1384995"/>
+            <a:off x="9456231" y="2010557"/>
+            <a:ext cx="2736000" cy="1384995"/>
           </a:xfrm>
           <a:prstGeom prst="rect">
             <a:avLst/>
@@ -7500,8 +7528,8 @@
           <a:p>
             <a:pPr algn="l"/>
             <a:r>
-              <a:rPr lang="en-GB" sz="1050" b="1" dirty="0" err="1"/>
-              <a:t>genAI</a:t>
+              <a:rPr lang="en-GB" sz="1050" b="1" dirty="0"/>
+              <a:t>LLM</a:t>
             </a:r>
             <a:r>
               <a:rPr lang="en-GB" sz="1050" dirty="0"/>
@@ -7525,8 +7553,8 @@
           </a:p>
           <a:p>
             <a:r>
-              <a:rPr lang="en-US" sz="1050" b="1" dirty="0" err="1"/>
-              <a:t>genAI</a:t>
+              <a:rPr lang="en-GB" sz="1050" b="1" dirty="0"/>
+              <a:t>LLM</a:t>
             </a:r>
             <a:r>
               <a:rPr lang="en-US" sz="1050" dirty="0"/>
@@ -7550,7 +7578,7 @@
         </p:nvSpPr>
         <p:spPr>
           <a:xfrm rot="16200000">
-            <a:off x="8910555" y="1109988"/>
+            <a:off x="8911872" y="1068681"/>
             <a:ext cx="784189" cy="307777"/>
           </a:xfrm>
           <a:prstGeom prst="rect">
@@ -7589,7 +7617,7 @@
         </p:nvSpPr>
         <p:spPr>
           <a:xfrm rot="16200000">
-            <a:off x="8722676" y="2670469"/>
+            <a:off x="8719508" y="2549165"/>
             <a:ext cx="1170513" cy="307777"/>
           </a:xfrm>
           <a:prstGeom prst="rect">
@@ -7628,7 +7656,7 @@
         </p:nvSpPr>
         <p:spPr>
           <a:xfrm rot="16200000">
-            <a:off x="8854950" y="4316174"/>
+            <a:off x="8851169" y="4276535"/>
             <a:ext cx="904222" cy="307777"/>
           </a:xfrm>
           <a:prstGeom prst="rect">
@@ -7667,7 +7695,7 @@
         </p:nvSpPr>
         <p:spPr>
           <a:xfrm rot="16200000">
-            <a:off x="8895146" y="5876655"/>
+            <a:off x="8886196" y="5927970"/>
             <a:ext cx="834396" cy="307777"/>
           </a:xfrm>
           <a:prstGeom prst="rect">

</xml_diff>

<commit_message>
change order of dependent variables, last figures done v7
</commit_message>
<xml_diff>
--- a/documents/figure1.pptx
+++ b/documents/figure1.pptx
@@ -117,7 +117,7 @@
 <file path=ppt/revisionInfo.xml><?xml version="1.0" encoding="utf-8"?>
 <p1510:revInfo xmlns:a="http://schemas.openxmlformats.org/drawingml/2006/main" xmlns:r="http://schemas.openxmlformats.org/officeDocument/2006/relationships" xmlns:p1510="http://schemas.microsoft.com/office/powerpoint/2015/10/main">
   <p1510:revLst>
-    <p1510:client id="{2A3F39FC-901B-4154-829D-ABB3A00DA094}" v="68" dt="2025-02-19T08:53:01.590"/>
+    <p1510:client id="{2A3F39FC-901B-4154-829D-ABB3A00DA094}" v="69" dt="2025-03-03T17:22:49.549"/>
   </p1510:revLst>
 </p1510:revInfo>
 </file>
@@ -127,7 +127,7 @@
   <pc:docChgLst>
     <pc:chgData name="Castiello de Obeso, Santiago" userId="b4fc0b8e-1f0e-417a-8aad-015961d2398a" providerId="ADAL" clId="{2A3F39FC-901B-4154-829D-ABB3A00DA094}"/>
     <pc:docChg chg="undo custSel addSld delSld modSld">
-      <pc:chgData name="Castiello de Obeso, Santiago" userId="b4fc0b8e-1f0e-417a-8aad-015961d2398a" providerId="ADAL" clId="{2A3F39FC-901B-4154-829D-ABB3A00DA094}" dt="2025-02-19T08:53:02.654" v="1681" actId="21"/>
+      <pc:chgData name="Castiello de Obeso, Santiago" userId="b4fc0b8e-1f0e-417a-8aad-015961d2398a" providerId="ADAL" clId="{2A3F39FC-901B-4154-829D-ABB3A00DA094}" dt="2025-03-03T17:22:50.386" v="1695" actId="21"/>
       <pc:docMkLst>
         <pc:docMk/>
       </pc:docMkLst>
@@ -641,7 +641,7 @@
         </pc:cxnChg>
       </pc:sldChg>
       <pc:sldChg chg="addSp delSp modSp add mod">
-        <pc:chgData name="Castiello de Obeso, Santiago" userId="b4fc0b8e-1f0e-417a-8aad-015961d2398a" providerId="ADAL" clId="{2A3F39FC-901B-4154-829D-ABB3A00DA094}" dt="2025-02-19T08:53:02.654" v="1681" actId="21"/>
+        <pc:chgData name="Castiello de Obeso, Santiago" userId="b4fc0b8e-1f0e-417a-8aad-015961d2398a" providerId="ADAL" clId="{2A3F39FC-901B-4154-829D-ABB3A00DA094}" dt="2025-03-03T17:22:50.386" v="1695" actId="21"/>
         <pc:sldMkLst>
           <pc:docMk/>
           <pc:sldMk cId="2654144847" sldId="259"/>
@@ -679,7 +679,7 @@
           </ac:spMkLst>
         </pc:spChg>
         <pc:spChg chg="mod">
-          <ac:chgData name="Castiello de Obeso, Santiago" userId="b4fc0b8e-1f0e-417a-8aad-015961d2398a" providerId="ADAL" clId="{2A3F39FC-901B-4154-829D-ABB3A00DA094}" dt="2025-02-19T08:52:45.789" v="1673" actId="1036"/>
+          <ac:chgData name="Castiello de Obeso, Santiago" userId="b4fc0b8e-1f0e-417a-8aad-015961d2398a" providerId="ADAL" clId="{2A3F39FC-901B-4154-829D-ABB3A00DA094}" dt="2025-03-03T16:09:15.374" v="1687" actId="6549"/>
           <ac:spMkLst>
             <pc:docMk/>
             <pc:sldMk cId="2654144847" sldId="259"/>
@@ -687,7 +687,7 @@
           </ac:spMkLst>
         </pc:spChg>
         <pc:spChg chg="mod">
-          <ac:chgData name="Castiello de Obeso, Santiago" userId="b4fc0b8e-1f0e-417a-8aad-015961d2398a" providerId="ADAL" clId="{2A3F39FC-901B-4154-829D-ABB3A00DA094}" dt="2025-02-19T08:52:50.426" v="1679" actId="1036"/>
+          <ac:chgData name="Castiello de Obeso, Santiago" userId="b4fc0b8e-1f0e-417a-8aad-015961d2398a" providerId="ADAL" clId="{2A3F39FC-901B-4154-829D-ABB3A00DA094}" dt="2025-03-03T16:09:18.900" v="1693" actId="6549"/>
           <ac:spMkLst>
             <pc:docMk/>
             <pc:sldMk cId="2654144847" sldId="259"/>
@@ -727,11 +727,11 @@
           </ac:spMkLst>
         </pc:spChg>
         <pc:picChg chg="add del">
-          <ac:chgData name="Castiello de Obeso, Santiago" userId="b4fc0b8e-1f0e-417a-8aad-015961d2398a" providerId="ADAL" clId="{2A3F39FC-901B-4154-829D-ABB3A00DA094}" dt="2025-02-19T08:53:02.654" v="1681" actId="21"/>
+          <ac:chgData name="Castiello de Obeso, Santiago" userId="b4fc0b8e-1f0e-417a-8aad-015961d2398a" providerId="ADAL" clId="{2A3F39FC-901B-4154-829D-ABB3A00DA094}" dt="2025-03-03T17:22:50.386" v="1695" actId="21"/>
           <ac:picMkLst>
             <pc:docMk/>
             <pc:sldMk cId="2654144847" sldId="259"/>
-            <ac:picMk id="3" creationId="{A0CEC4DE-B50C-731D-6C3B-0321DB859291}"/>
+            <ac:picMk id="3" creationId="{6F941A14-5737-BF56-B0A2-05484DA38A27}"/>
           </ac:picMkLst>
         </pc:picChg>
       </pc:sldChg>
@@ -889,7 +889,7 @@
           <a:p>
             <a:fld id="{0AFA125D-6C16-440D-B65A-850231F6884E}" type="datetimeFigureOut">
               <a:rPr lang="en-GB" smtClean="0"/>
-              <a:t>19/02/2025</a:t>
+              <a:t>03/03/2025</a:t>
             </a:fld>
             <a:endParaRPr lang="en-GB"/>
           </a:p>
@@ -1089,7 +1089,7 @@
           <a:p>
             <a:fld id="{0AFA125D-6C16-440D-B65A-850231F6884E}" type="datetimeFigureOut">
               <a:rPr lang="en-GB" smtClean="0"/>
-              <a:t>19/02/2025</a:t>
+              <a:t>03/03/2025</a:t>
             </a:fld>
             <a:endParaRPr lang="en-GB"/>
           </a:p>
@@ -1299,7 +1299,7 @@
           <a:p>
             <a:fld id="{0AFA125D-6C16-440D-B65A-850231F6884E}" type="datetimeFigureOut">
               <a:rPr lang="en-GB" smtClean="0"/>
-              <a:t>19/02/2025</a:t>
+              <a:t>03/03/2025</a:t>
             </a:fld>
             <a:endParaRPr lang="en-GB"/>
           </a:p>
@@ -1499,7 +1499,7 @@
           <a:p>
             <a:fld id="{0AFA125D-6C16-440D-B65A-850231F6884E}" type="datetimeFigureOut">
               <a:rPr lang="en-GB" smtClean="0"/>
-              <a:t>19/02/2025</a:t>
+              <a:t>03/03/2025</a:t>
             </a:fld>
             <a:endParaRPr lang="en-GB"/>
           </a:p>
@@ -1775,7 +1775,7 @@
           <a:p>
             <a:fld id="{0AFA125D-6C16-440D-B65A-850231F6884E}" type="datetimeFigureOut">
               <a:rPr lang="en-GB" smtClean="0"/>
-              <a:t>19/02/2025</a:t>
+              <a:t>03/03/2025</a:t>
             </a:fld>
             <a:endParaRPr lang="en-GB"/>
           </a:p>
@@ -2043,7 +2043,7 @@
           <a:p>
             <a:fld id="{0AFA125D-6C16-440D-B65A-850231F6884E}" type="datetimeFigureOut">
               <a:rPr lang="en-GB" smtClean="0"/>
-              <a:t>19/02/2025</a:t>
+              <a:t>03/03/2025</a:t>
             </a:fld>
             <a:endParaRPr lang="en-GB"/>
           </a:p>
@@ -2458,7 +2458,7 @@
           <a:p>
             <a:fld id="{0AFA125D-6C16-440D-B65A-850231F6884E}" type="datetimeFigureOut">
               <a:rPr lang="en-GB" smtClean="0"/>
-              <a:t>19/02/2025</a:t>
+              <a:t>03/03/2025</a:t>
             </a:fld>
             <a:endParaRPr lang="en-GB"/>
           </a:p>
@@ -2600,7 +2600,7 @@
           <a:p>
             <a:fld id="{0AFA125D-6C16-440D-B65A-850231F6884E}" type="datetimeFigureOut">
               <a:rPr lang="en-GB" smtClean="0"/>
-              <a:t>19/02/2025</a:t>
+              <a:t>03/03/2025</a:t>
             </a:fld>
             <a:endParaRPr lang="en-GB"/>
           </a:p>
@@ -2713,7 +2713,7 @@
           <a:p>
             <a:fld id="{0AFA125D-6C16-440D-B65A-850231F6884E}" type="datetimeFigureOut">
               <a:rPr lang="en-GB" smtClean="0"/>
-              <a:t>19/02/2025</a:t>
+              <a:t>03/03/2025</a:t>
             </a:fld>
             <a:endParaRPr lang="en-GB"/>
           </a:p>
@@ -3026,7 +3026,7 @@
           <a:p>
             <a:fld id="{0AFA125D-6C16-440D-B65A-850231F6884E}" type="datetimeFigureOut">
               <a:rPr lang="en-GB" smtClean="0"/>
-              <a:t>19/02/2025</a:t>
+              <a:t>03/03/2025</a:t>
             </a:fld>
             <a:endParaRPr lang="en-GB"/>
           </a:p>
@@ -3315,7 +3315,7 @@
           <a:p>
             <a:fld id="{0AFA125D-6C16-440D-B65A-850231F6884E}" type="datetimeFigureOut">
               <a:rPr lang="en-GB" smtClean="0"/>
-              <a:t>19/02/2025</a:t>
+              <a:t>03/03/2025</a:t>
             </a:fld>
             <a:endParaRPr lang="en-GB"/>
           </a:p>
@@ -3558,7 +3558,7 @@
           <a:p>
             <a:fld id="{0AFA125D-6C16-440D-B65A-850231F6884E}" type="datetimeFigureOut">
               <a:rPr lang="en-GB" smtClean="0"/>
-              <a:t>19/02/2025</a:t>
+              <a:t>03/03/2025</a:t>
             </a:fld>
             <a:endParaRPr lang="en-GB"/>
           </a:p>
@@ -7578,8 +7578,8 @@
         </p:nvSpPr>
         <p:spPr>
           <a:xfrm rot="16200000">
-            <a:off x="8911872" y="1068681"/>
-            <a:ext cx="784189" cy="307777"/>
+            <a:off x="8885422" y="1068681"/>
+            <a:ext cx="837089" cy="307777"/>
           </a:xfrm>
           <a:prstGeom prst="rect">
             <a:avLst/>
@@ -7598,7 +7598,7 @@
                   <a:srgbClr val="0072B2"/>
                 </a:solidFill>
               </a:rPr>
-              <a:t>Anxiety </a:t>
+              <a:t>Anxious </a:t>
             </a:r>
           </a:p>
         </p:txBody>
@@ -7617,8 +7617,8 @@
         </p:nvSpPr>
         <p:spPr>
           <a:xfrm rot="16200000">
-            <a:off x="8719508" y="2549165"/>
-            <a:ext cx="1170513" cy="307777"/>
+            <a:off x="8693058" y="2549165"/>
+            <a:ext cx="1223412" cy="307777"/>
           </a:xfrm>
           <a:prstGeom prst="rect">
             <a:avLst/>
@@ -7637,7 +7637,7 @@
                   <a:srgbClr val="D55E00"/>
                 </a:solidFill>
               </a:rPr>
-              <a:t>Non-Anxiety </a:t>
+              <a:t>Non-Anxious </a:t>
             </a:r>
           </a:p>
         </p:txBody>

</xml_diff>